<commit_message>
update system analysis project
</commit_message>
<xml_diff>
--- a/System Anlysis Project/Code01.pptx
+++ b/System Anlysis Project/Code01.pptx
@@ -11,6 +11,9 @@
     <p:sldId id="259" r:id="rId5"/>
     <p:sldId id="260" r:id="rId6"/>
     <p:sldId id="261" r:id="rId7"/>
+    <p:sldId id="263" r:id="rId8"/>
+    <p:sldId id="264" r:id="rId9"/>
+    <p:sldId id="265" r:id="rId10"/>
   </p:sldIdLst>
   <p:sldSz cx="9144000" cy="6858000" type="screen4x3"/>
   <p:notesSz cx="6858000" cy="9144000"/>
@@ -119,6 +122,9 @@
             <p14:sldId id="259"/>
             <p14:sldId id="260"/>
             <p14:sldId id="261"/>
+            <p14:sldId id="263"/>
+            <p14:sldId id="264"/>
+            <p14:sldId id="265"/>
           </p14:sldIdLst>
         </p14:section>
       </p14:sectionLst>
@@ -395,7 +401,7 @@
           <a:p>
             <a:fld id="{FB42DCDE-1F57-400F-9ED3-4C45F4E0F332}" type="datetimeFigureOut">
               <a:rPr lang="en-US" smtClean="0"/>
-              <a:t>11/1/2019</a:t>
+              <a:t>12/22/2019</a:t>
             </a:fld>
             <a:endParaRPr lang="en-US"/>
           </a:p>
@@ -558,7 +564,7 @@
           <a:p>
             <a:fld id="{FB42DCDE-1F57-400F-9ED3-4C45F4E0F332}" type="datetimeFigureOut">
               <a:rPr lang="en-US" smtClean="0"/>
-              <a:t>11/1/2019</a:t>
+              <a:t>12/22/2019</a:t>
             </a:fld>
             <a:endParaRPr lang="en-US"/>
           </a:p>
@@ -731,7 +737,7 @@
           <a:p>
             <a:fld id="{FB42DCDE-1F57-400F-9ED3-4C45F4E0F332}" type="datetimeFigureOut">
               <a:rPr lang="en-US" smtClean="0"/>
-              <a:t>11/1/2019</a:t>
+              <a:t>12/22/2019</a:t>
             </a:fld>
             <a:endParaRPr lang="en-US"/>
           </a:p>
@@ -1006,7 +1012,7 @@
             <a:fld id="{53074F12-AA26-4AC8-9962-C36BB8F32554}" type="datetimeFigureOut">
               <a:rPr lang="en-US" smtClean="0"/>
               <a:pPr/>
-              <a:t>11/1/2019</a:t>
+              <a:t>12/22/2019</a:t>
             </a:fld>
             <a:endParaRPr lang="en-US"/>
           </a:p>
@@ -1239,7 +1245,7 @@
             <a:fld id="{53074F12-AA26-4AC8-9962-C36BB8F32554}" type="datetimeFigureOut">
               <a:rPr lang="en-US" smtClean="0"/>
               <a:pPr/>
-              <a:t>11/1/2019</a:t>
+              <a:t>12/22/2019</a:t>
             </a:fld>
             <a:endParaRPr lang="en-US"/>
           </a:p>
@@ -1498,7 +1504,7 @@
             <a:fld id="{53074F12-AA26-4AC8-9962-C36BB8F32554}" type="datetimeFigureOut">
               <a:rPr lang="en-US" smtClean="0"/>
               <a:pPr/>
-              <a:t>11/1/2019</a:t>
+              <a:t>12/22/2019</a:t>
             </a:fld>
             <a:endParaRPr lang="en-US"/>
           </a:p>
@@ -1745,7 +1751,7 @@
             <a:fld id="{53074F12-AA26-4AC8-9962-C36BB8F32554}" type="datetimeFigureOut">
               <a:rPr lang="en-US" smtClean="0"/>
               <a:pPr/>
-              <a:t>11/1/2019</a:t>
+              <a:t>12/22/2019</a:t>
             </a:fld>
             <a:endParaRPr lang="en-US"/>
           </a:p>
@@ -2032,7 +2038,7 @@
             <a:fld id="{53074F12-AA26-4AC8-9962-C36BB8F32554}" type="datetimeFigureOut">
               <a:rPr lang="en-US" smtClean="0"/>
               <a:pPr/>
-              <a:t>11/1/2019</a:t>
+              <a:t>12/22/2019</a:t>
             </a:fld>
             <a:endParaRPr lang="en-US"/>
           </a:p>
@@ -2519,7 +2525,7 @@
             <a:fld id="{53074F12-AA26-4AC8-9962-C36BB8F32554}" type="datetimeFigureOut">
               <a:rPr lang="en-US" smtClean="0"/>
               <a:pPr/>
-              <a:t>11/1/2019</a:t>
+              <a:t>12/22/2019</a:t>
             </a:fld>
             <a:endParaRPr lang="en-US"/>
           </a:p>
@@ -2638,7 +2644,7 @@
             <a:fld id="{53074F12-AA26-4AC8-9962-C36BB8F32554}" type="datetimeFigureOut">
               <a:rPr lang="en-US" smtClean="0"/>
               <a:pPr/>
-              <a:t>11/1/2019</a:t>
+              <a:t>12/22/2019</a:t>
             </a:fld>
             <a:endParaRPr lang="en-US"/>
           </a:p>
@@ -2735,7 +2741,7 @@
             <a:fld id="{53074F12-AA26-4AC8-9962-C36BB8F32554}" type="datetimeFigureOut">
               <a:rPr lang="en-US" smtClean="0"/>
               <a:pPr/>
-              <a:t>11/1/2019</a:t>
+              <a:t>12/22/2019</a:t>
             </a:fld>
             <a:endParaRPr lang="en-US"/>
           </a:p>
@@ -2904,7 +2910,7 @@
           <a:p>
             <a:fld id="{FB42DCDE-1F57-400F-9ED3-4C45F4E0F332}" type="datetimeFigureOut">
               <a:rPr lang="en-US" smtClean="0"/>
-              <a:t>11/1/2019</a:t>
+              <a:t>12/22/2019</a:t>
             </a:fld>
             <a:endParaRPr lang="en-US"/>
           </a:p>
@@ -3175,7 +3181,7 @@
             <a:fld id="{53074F12-AA26-4AC8-9962-C36BB8F32554}" type="datetimeFigureOut">
               <a:rPr lang="en-US" smtClean="0"/>
               <a:pPr/>
-              <a:t>11/1/2019</a:t>
+              <a:t>12/22/2019</a:t>
             </a:fld>
             <a:endParaRPr lang="en-US"/>
           </a:p>
@@ -3429,7 +3435,7 @@
             <a:fld id="{53074F12-AA26-4AC8-9962-C36BB8F32554}" type="datetimeFigureOut">
               <a:rPr lang="en-US" smtClean="0"/>
               <a:pPr/>
-              <a:t>11/1/2019</a:t>
+              <a:t>12/22/2019</a:t>
             </a:fld>
             <a:endParaRPr lang="en-US"/>
           </a:p>
@@ -3599,7 +3605,7 @@
             <a:fld id="{53074F12-AA26-4AC8-9962-C36BB8F32554}" type="datetimeFigureOut">
               <a:rPr lang="en-US" smtClean="0"/>
               <a:pPr/>
-              <a:t>11/1/2019</a:t>
+              <a:t>12/22/2019</a:t>
             </a:fld>
             <a:endParaRPr lang="en-US"/>
           </a:p>
@@ -3779,7 +3785,7 @@
             <a:fld id="{53074F12-AA26-4AC8-9962-C36BB8F32554}" type="datetimeFigureOut">
               <a:rPr lang="en-US" smtClean="0"/>
               <a:pPr/>
-              <a:t>11/1/2019</a:t>
+              <a:t>12/22/2019</a:t>
             </a:fld>
             <a:endParaRPr lang="en-US"/>
           </a:p>
@@ -4074,7 +4080,7 @@
           <a:p>
             <a:fld id="{FB42DCDE-1F57-400F-9ED3-4C45F4E0F332}" type="datetimeFigureOut">
               <a:rPr lang="en-US" smtClean="0"/>
-              <a:t>11/1/2019</a:t>
+              <a:t>12/22/2019</a:t>
             </a:fld>
             <a:endParaRPr lang="en-US"/>
           </a:p>
@@ -4354,7 +4360,7 @@
           <a:p>
             <a:fld id="{FB42DCDE-1F57-400F-9ED3-4C45F4E0F332}" type="datetimeFigureOut">
               <a:rPr lang="en-US" smtClean="0"/>
-              <a:t>11/1/2019</a:t>
+              <a:t>12/22/2019</a:t>
             </a:fld>
             <a:endParaRPr lang="en-US"/>
           </a:p>
@@ -4768,7 +4774,7 @@
           <a:p>
             <a:fld id="{FB42DCDE-1F57-400F-9ED3-4C45F4E0F332}" type="datetimeFigureOut">
               <a:rPr lang="en-US" smtClean="0"/>
-              <a:t>11/1/2019</a:t>
+              <a:t>12/22/2019</a:t>
             </a:fld>
             <a:endParaRPr lang="en-US"/>
           </a:p>
@@ -4880,7 +4886,7 @@
           <a:p>
             <a:fld id="{FB42DCDE-1F57-400F-9ED3-4C45F4E0F332}" type="datetimeFigureOut">
               <a:rPr lang="en-US" smtClean="0"/>
-              <a:t>11/1/2019</a:t>
+              <a:t>12/22/2019</a:t>
             </a:fld>
             <a:endParaRPr lang="en-US"/>
           </a:p>
@@ -4970,7 +4976,7 @@
           <a:p>
             <a:fld id="{FB42DCDE-1F57-400F-9ED3-4C45F4E0F332}" type="datetimeFigureOut">
               <a:rPr lang="en-US" smtClean="0"/>
-              <a:t>11/1/2019</a:t>
+              <a:t>12/22/2019</a:t>
             </a:fld>
             <a:endParaRPr lang="en-US"/>
           </a:p>
@@ -5240,7 +5246,7 @@
           <a:p>
             <a:fld id="{FB42DCDE-1F57-400F-9ED3-4C45F4E0F332}" type="datetimeFigureOut">
               <a:rPr lang="en-US" smtClean="0"/>
-              <a:t>11/1/2019</a:t>
+              <a:t>12/22/2019</a:t>
             </a:fld>
             <a:endParaRPr lang="en-US"/>
           </a:p>
@@ -5490,7 +5496,7 @@
           <a:p>
             <a:fld id="{FB42DCDE-1F57-400F-9ED3-4C45F4E0F332}" type="datetimeFigureOut">
               <a:rPr lang="en-US" smtClean="0"/>
-              <a:t>11/1/2019</a:t>
+              <a:t>12/22/2019</a:t>
             </a:fld>
             <a:endParaRPr lang="en-US"/>
           </a:p>
@@ -5707,7 +5713,7 @@
           <a:p>
             <a:fld id="{FB42DCDE-1F57-400F-9ED3-4C45F4E0F332}" type="datetimeFigureOut">
               <a:rPr lang="en-US" smtClean="0"/>
-              <a:t>11/1/2019</a:t>
+              <a:t>12/22/2019</a:t>
             </a:fld>
             <a:endParaRPr lang="en-US"/>
           </a:p>
@@ -6232,7 +6238,7 @@
             <a:fld id="{53074F12-AA26-4AC8-9962-C36BB8F32554}" type="datetimeFigureOut">
               <a:rPr lang="en-US" smtClean="0"/>
               <a:pPr/>
-              <a:t>11/1/2019</a:t>
+              <a:t>12/22/2019</a:t>
             </a:fld>
             <a:endParaRPr lang="en-US"/>
           </a:p>
@@ -8902,10 +8908,10 @@
       </p:sp>
       <p:pic>
         <p:nvPicPr>
-          <p:cNvPr id="6" name="Content Placeholder 5">
+          <p:cNvPr id="7" name="Content Placeholder 6">
             <a:extLst>
               <a:ext uri="{FF2B5EF4-FFF2-40B4-BE49-F238E27FC236}">
-                <a16:creationId xmlns:a16="http://schemas.microsoft.com/office/drawing/2014/main" id="{34D50F42-38BA-47D8-95DD-ACC6C2A29D57}"/>
+                <a16:creationId xmlns:a16="http://schemas.microsoft.com/office/drawing/2014/main" id="{E31C8F4D-D109-4D81-9A0F-CE8614E7492C}"/>
               </a:ext>
             </a:extLst>
           </p:cNvPr>
@@ -8930,8 +8936,8 @@
         </p:blipFill>
         <p:spPr>
           <a:xfrm>
-            <a:off x="-381000" y="-914400"/>
-            <a:ext cx="9753600" cy="8839200"/>
+            <a:off x="-5500" y="-381000"/>
+            <a:ext cx="9225699" cy="8288432"/>
           </a:xfrm>
         </p:spPr>
       </p:pic>
@@ -8939,6 +8945,312 @@
     <p:extLst>
       <p:ext uri="{BB962C8B-B14F-4D97-AF65-F5344CB8AC3E}">
         <p14:creationId xmlns:p14="http://schemas.microsoft.com/office/powerpoint/2010/main" val="1105652652"/>
+      </p:ext>
+    </p:extLst>
+  </p:cSld>
+  <p:clrMapOvr>
+    <a:masterClrMapping/>
+  </p:clrMapOvr>
+  <mc:AlternateContent xmlns:mc="http://schemas.openxmlformats.org/markup-compatibility/2006" xmlns:p14="http://schemas.microsoft.com/office/powerpoint/2010/main">
+    <mc:Choice Requires="p14">
+      <p:transition spd="slow" p14:dur="1500">
+        <p:split orient="vert"/>
+      </p:transition>
+    </mc:Choice>
+    <mc:Fallback xmlns="">
+      <p:transition spd="slow">
+        <p:split orient="vert"/>
+      </p:transition>
+    </mc:Fallback>
+  </mc:AlternateContent>
+</p:sld>
+</file>
+
+<file path=ppt/slides/slide6.xml><?xml version="1.0" encoding="utf-8"?>
+<p:sld xmlns:a="http://schemas.openxmlformats.org/drawingml/2006/main" xmlns:r="http://schemas.openxmlformats.org/officeDocument/2006/relationships" xmlns:p="http://schemas.openxmlformats.org/presentationml/2006/main">
+  <p:cSld>
+    <p:spTree>
+      <p:nvGrpSpPr>
+        <p:cNvPr id="1" name=""/>
+        <p:cNvGrpSpPr/>
+        <p:nvPr/>
+      </p:nvGrpSpPr>
+      <p:grpSpPr>
+        <a:xfrm>
+          <a:off x="0" y="0"/>
+          <a:ext cx="0" cy="0"/>
+          <a:chOff x="0" y="0"/>
+          <a:chExt cx="0" cy="0"/>
+        </a:xfrm>
+      </p:grpSpPr>
+      <p:sp>
+        <p:nvSpPr>
+          <p:cNvPr id="5" name="Title 4">
+            <a:extLst>
+              <a:ext uri="{FF2B5EF4-FFF2-40B4-BE49-F238E27FC236}">
+                <a16:creationId xmlns:a16="http://schemas.microsoft.com/office/drawing/2014/main" id="{E94ADF82-5D03-4EFE-9F00-CCF894F10E7E}"/>
+              </a:ext>
+            </a:extLst>
+          </p:cNvPr>
+          <p:cNvSpPr>
+            <a:spLocks noGrp="1"/>
+          </p:cNvSpPr>
+          <p:nvPr>
+            <p:ph type="title"/>
+          </p:nvPr>
+        </p:nvSpPr>
+        <p:spPr/>
+        <p:txBody>
+          <a:bodyPr/>
+          <a:lstStyle/>
+          <a:p>
+            <a:endParaRPr lang="en-US" dirty="0"/>
+          </a:p>
+        </p:txBody>
+      </p:sp>
+      <p:pic>
+        <p:nvPicPr>
+          <p:cNvPr id="6" name="Content Placeholder 5">
+            <a:extLst>
+              <a:ext uri="{FF2B5EF4-FFF2-40B4-BE49-F238E27FC236}">
+                <a16:creationId xmlns:a16="http://schemas.microsoft.com/office/drawing/2014/main" id="{72F12783-0FAF-4B2A-ABA7-8C76F5DD3ACA}"/>
+              </a:ext>
+            </a:extLst>
+          </p:cNvPr>
+          <p:cNvPicPr>
+            <a:picLocks noGrp="1" noChangeAspect="1"/>
+          </p:cNvPicPr>
+          <p:nvPr>
+            <p:ph idx="1"/>
+          </p:nvPr>
+        </p:nvPicPr>
+        <p:blipFill>
+          <a:blip r:embed="rId2" cstate="print">
+            <a:extLst>
+              <a:ext uri="{28A0092B-C50C-407E-A947-70E740481C1C}">
+                <a14:useLocalDpi xmlns:a14="http://schemas.microsoft.com/office/drawing/2010/main" val="0"/>
+              </a:ext>
+            </a:extLst>
+          </a:blip>
+          <a:stretch>
+            <a:fillRect/>
+          </a:stretch>
+        </p:blipFill>
+        <p:spPr>
+          <a:xfrm>
+            <a:off x="-228600" y="0"/>
+            <a:ext cx="9372599" cy="7543800"/>
+          </a:xfrm>
+        </p:spPr>
+      </p:pic>
+    </p:spTree>
+    <p:extLst>
+      <p:ext uri="{BB962C8B-B14F-4D97-AF65-F5344CB8AC3E}">
+        <p14:creationId xmlns:p14="http://schemas.microsoft.com/office/powerpoint/2010/main" val="2322517623"/>
+      </p:ext>
+    </p:extLst>
+  </p:cSld>
+  <p:clrMapOvr>
+    <a:masterClrMapping/>
+  </p:clrMapOvr>
+  <mc:AlternateContent xmlns:mc="http://schemas.openxmlformats.org/markup-compatibility/2006" xmlns:p14="http://schemas.microsoft.com/office/powerpoint/2010/main">
+    <mc:Choice Requires="p14">
+      <p:transition spd="slow" p14:dur="1500">
+        <p:split orient="vert"/>
+      </p:transition>
+    </mc:Choice>
+    <mc:Fallback xmlns="">
+      <p:transition spd="slow">
+        <p:split orient="vert"/>
+      </p:transition>
+    </mc:Fallback>
+  </mc:AlternateContent>
+</p:sld>
+</file>
+
+<file path=ppt/slides/slide7.xml><?xml version="1.0" encoding="utf-8"?>
+<p:sld xmlns:a="http://schemas.openxmlformats.org/drawingml/2006/main" xmlns:r="http://schemas.openxmlformats.org/officeDocument/2006/relationships" xmlns:p="http://schemas.openxmlformats.org/presentationml/2006/main">
+  <p:cSld>
+    <p:spTree>
+      <p:nvGrpSpPr>
+        <p:cNvPr id="1" name=""/>
+        <p:cNvGrpSpPr/>
+        <p:nvPr/>
+      </p:nvGrpSpPr>
+      <p:grpSpPr>
+        <a:xfrm>
+          <a:off x="0" y="0"/>
+          <a:ext cx="0" cy="0"/>
+          <a:chOff x="0" y="0"/>
+          <a:chExt cx="0" cy="0"/>
+        </a:xfrm>
+      </p:grpSpPr>
+      <p:sp>
+        <p:nvSpPr>
+          <p:cNvPr id="5" name="Title 4">
+            <a:extLst>
+              <a:ext uri="{FF2B5EF4-FFF2-40B4-BE49-F238E27FC236}">
+                <a16:creationId xmlns:a16="http://schemas.microsoft.com/office/drawing/2014/main" id="{E94ADF82-5D03-4EFE-9F00-CCF894F10E7E}"/>
+              </a:ext>
+            </a:extLst>
+          </p:cNvPr>
+          <p:cNvSpPr>
+            <a:spLocks noGrp="1"/>
+          </p:cNvSpPr>
+          <p:nvPr>
+            <p:ph type="title"/>
+          </p:nvPr>
+        </p:nvSpPr>
+        <p:spPr/>
+        <p:txBody>
+          <a:bodyPr/>
+          <a:lstStyle/>
+          <a:p>
+            <a:endParaRPr lang="en-US" dirty="0"/>
+          </a:p>
+        </p:txBody>
+      </p:sp>
+      <p:pic>
+        <p:nvPicPr>
+          <p:cNvPr id="7" name="Content Placeholder 6">
+            <a:extLst>
+              <a:ext uri="{FF2B5EF4-FFF2-40B4-BE49-F238E27FC236}">
+                <a16:creationId xmlns:a16="http://schemas.microsoft.com/office/drawing/2014/main" id="{5B11E891-B8E6-4017-B294-D5EAB6D25155}"/>
+              </a:ext>
+            </a:extLst>
+          </p:cNvPr>
+          <p:cNvPicPr>
+            <a:picLocks noGrp="1" noChangeAspect="1"/>
+          </p:cNvPicPr>
+          <p:nvPr>
+            <p:ph idx="1"/>
+          </p:nvPr>
+        </p:nvPicPr>
+        <p:blipFill>
+          <a:blip r:embed="rId2" cstate="print">
+            <a:extLst>
+              <a:ext uri="{28A0092B-C50C-407E-A947-70E740481C1C}">
+                <a14:useLocalDpi xmlns:a14="http://schemas.microsoft.com/office/drawing/2010/main" val="0"/>
+              </a:ext>
+            </a:extLst>
+          </a:blip>
+          <a:stretch>
+            <a:fillRect/>
+          </a:stretch>
+        </p:blipFill>
+        <p:spPr>
+          <a:xfrm>
+            <a:off x="-152399" y="0"/>
+            <a:ext cx="9296400" cy="6839816"/>
+          </a:xfrm>
+        </p:spPr>
+      </p:pic>
+    </p:spTree>
+    <p:extLst>
+      <p:ext uri="{BB962C8B-B14F-4D97-AF65-F5344CB8AC3E}">
+        <p14:creationId xmlns:p14="http://schemas.microsoft.com/office/powerpoint/2010/main" val="890873864"/>
+      </p:ext>
+    </p:extLst>
+  </p:cSld>
+  <p:clrMapOvr>
+    <a:masterClrMapping/>
+  </p:clrMapOvr>
+  <mc:AlternateContent xmlns:mc="http://schemas.openxmlformats.org/markup-compatibility/2006" xmlns:p14="http://schemas.microsoft.com/office/powerpoint/2010/main">
+    <mc:Choice Requires="p14">
+      <p:transition spd="slow" p14:dur="1500">
+        <p:split orient="vert"/>
+      </p:transition>
+    </mc:Choice>
+    <mc:Fallback xmlns="">
+      <p:transition spd="slow">
+        <p:split orient="vert"/>
+      </p:transition>
+    </mc:Fallback>
+  </mc:AlternateContent>
+</p:sld>
+</file>
+
+<file path=ppt/slides/slide8.xml><?xml version="1.0" encoding="utf-8"?>
+<p:sld xmlns:a="http://schemas.openxmlformats.org/drawingml/2006/main" xmlns:r="http://schemas.openxmlformats.org/officeDocument/2006/relationships" xmlns:p="http://schemas.openxmlformats.org/presentationml/2006/main">
+  <p:cSld>
+    <p:spTree>
+      <p:nvGrpSpPr>
+        <p:cNvPr id="1" name=""/>
+        <p:cNvGrpSpPr/>
+        <p:nvPr/>
+      </p:nvGrpSpPr>
+      <p:grpSpPr>
+        <a:xfrm>
+          <a:off x="0" y="0"/>
+          <a:ext cx="0" cy="0"/>
+          <a:chOff x="0" y="0"/>
+          <a:chExt cx="0" cy="0"/>
+        </a:xfrm>
+      </p:grpSpPr>
+      <p:sp>
+        <p:nvSpPr>
+          <p:cNvPr id="5" name="Title 4">
+            <a:extLst>
+              <a:ext uri="{FF2B5EF4-FFF2-40B4-BE49-F238E27FC236}">
+                <a16:creationId xmlns:a16="http://schemas.microsoft.com/office/drawing/2014/main" id="{E94ADF82-5D03-4EFE-9F00-CCF894F10E7E}"/>
+              </a:ext>
+            </a:extLst>
+          </p:cNvPr>
+          <p:cNvSpPr>
+            <a:spLocks noGrp="1"/>
+          </p:cNvSpPr>
+          <p:nvPr>
+            <p:ph type="title"/>
+          </p:nvPr>
+        </p:nvSpPr>
+        <p:spPr/>
+        <p:txBody>
+          <a:bodyPr/>
+          <a:lstStyle/>
+          <a:p>
+            <a:endParaRPr lang="en-US" dirty="0"/>
+          </a:p>
+        </p:txBody>
+      </p:sp>
+      <p:pic>
+        <p:nvPicPr>
+          <p:cNvPr id="4" name="Content Placeholder 3">
+            <a:extLst>
+              <a:ext uri="{FF2B5EF4-FFF2-40B4-BE49-F238E27FC236}">
+                <a16:creationId xmlns:a16="http://schemas.microsoft.com/office/drawing/2014/main" id="{A31A8663-7A4E-4336-9009-CA73761E55E6}"/>
+              </a:ext>
+            </a:extLst>
+          </p:cNvPr>
+          <p:cNvPicPr>
+            <a:picLocks noGrp="1" noChangeAspect="1"/>
+          </p:cNvPicPr>
+          <p:nvPr>
+            <p:ph idx="1"/>
+          </p:nvPr>
+        </p:nvPicPr>
+        <p:blipFill>
+          <a:blip r:embed="rId2" cstate="print">
+            <a:extLst>
+              <a:ext uri="{28A0092B-C50C-407E-A947-70E740481C1C}">
+                <a14:useLocalDpi xmlns:a14="http://schemas.microsoft.com/office/drawing/2010/main" val="0"/>
+              </a:ext>
+            </a:extLst>
+          </a:blip>
+          <a:stretch>
+            <a:fillRect/>
+          </a:stretch>
+        </p:blipFill>
+        <p:spPr>
+          <a:xfrm>
+            <a:off x="-76200" y="-152400"/>
+            <a:ext cx="9753600" cy="7391400"/>
+          </a:xfrm>
+        </p:spPr>
+      </p:pic>
+    </p:spTree>
+    <p:extLst>
+      <p:ext uri="{BB962C8B-B14F-4D97-AF65-F5344CB8AC3E}">
+        <p14:creationId xmlns:p14="http://schemas.microsoft.com/office/powerpoint/2010/main" val="1698291588"/>
       </p:ext>
     </p:extLst>
   </p:cSld>

</xml_diff>